<commit_message>
Add the retrieval comparison figure
</commit_message>
<xml_diff>
--- a/masters/assets/figures_eng.pptx
+++ b/masters/assets/figures_eng.pptx
@@ -5,12 +5,13 @@
     <p:sldMasterId id="2147483648" r:id="rId1"/>
   </p:sldMasterIdLst>
   <p:notesMasterIdLst>
-    <p:notesMasterId r:id="rId5"/>
+    <p:notesMasterId r:id="rId6"/>
   </p:notesMasterIdLst>
   <p:sldIdLst>
     <p:sldId id="261" r:id="rId2"/>
     <p:sldId id="262" r:id="rId3"/>
     <p:sldId id="263" r:id="rId4"/>
+    <p:sldId id="264" r:id="rId5"/>
   </p:sldIdLst>
   <p:sldSz cx="12192000" cy="6858000"/>
   <p:notesSz cx="6858000" cy="9144000"/>
@@ -199,7 +200,7 @@
           <a:p>
             <a:fld id="{D30BF0A6-8A38-44D6-A4BD-739DE26469BE}" type="datetimeFigureOut">
               <a:rPr lang="en-US" smtClean="0"/>
-              <a:t>22-May-23</a:t>
+              <a:t>25-May-23</a:t>
             </a:fld>
             <a:endParaRPr lang="en-US" dirty="0"/>
           </a:p>
@@ -697,7 +698,7 @@
           <a:p>
             <a:fld id="{38FD5F5A-ADC8-40D1-8D83-4002D44F1092}" type="datetimeFigureOut">
               <a:rPr lang="en-US" smtClean="0"/>
-              <a:t>22-May-23</a:t>
+              <a:t>25-May-23</a:t>
             </a:fld>
             <a:endParaRPr lang="en-US" dirty="0"/>
           </a:p>
@@ -895,7 +896,7 @@
           <a:p>
             <a:fld id="{38FD5F5A-ADC8-40D1-8D83-4002D44F1092}" type="datetimeFigureOut">
               <a:rPr lang="en-US" smtClean="0"/>
-              <a:t>22-May-23</a:t>
+              <a:t>25-May-23</a:t>
             </a:fld>
             <a:endParaRPr lang="en-US" dirty="0"/>
           </a:p>
@@ -1103,7 +1104,7 @@
           <a:p>
             <a:fld id="{38FD5F5A-ADC8-40D1-8D83-4002D44F1092}" type="datetimeFigureOut">
               <a:rPr lang="en-US" smtClean="0"/>
-              <a:t>22-May-23</a:t>
+              <a:t>25-May-23</a:t>
             </a:fld>
             <a:endParaRPr lang="en-US" dirty="0"/>
           </a:p>
@@ -1301,7 +1302,7 @@
           <a:p>
             <a:fld id="{38FD5F5A-ADC8-40D1-8D83-4002D44F1092}" type="datetimeFigureOut">
               <a:rPr lang="en-US" smtClean="0"/>
-              <a:t>22-May-23</a:t>
+              <a:t>25-May-23</a:t>
             </a:fld>
             <a:endParaRPr lang="en-US" dirty="0"/>
           </a:p>
@@ -1576,7 +1577,7 @@
           <a:p>
             <a:fld id="{38FD5F5A-ADC8-40D1-8D83-4002D44F1092}" type="datetimeFigureOut">
               <a:rPr lang="en-US" smtClean="0"/>
-              <a:t>22-May-23</a:t>
+              <a:t>25-May-23</a:t>
             </a:fld>
             <a:endParaRPr lang="en-US" dirty="0"/>
           </a:p>
@@ -1841,7 +1842,7 @@
           <a:p>
             <a:fld id="{38FD5F5A-ADC8-40D1-8D83-4002D44F1092}" type="datetimeFigureOut">
               <a:rPr lang="en-US" smtClean="0"/>
-              <a:t>22-May-23</a:t>
+              <a:t>25-May-23</a:t>
             </a:fld>
             <a:endParaRPr lang="en-US" dirty="0"/>
           </a:p>
@@ -2253,7 +2254,7 @@
           <a:p>
             <a:fld id="{38FD5F5A-ADC8-40D1-8D83-4002D44F1092}" type="datetimeFigureOut">
               <a:rPr lang="en-US" smtClean="0"/>
-              <a:t>22-May-23</a:t>
+              <a:t>25-May-23</a:t>
             </a:fld>
             <a:endParaRPr lang="en-US" dirty="0"/>
           </a:p>
@@ -2394,7 +2395,7 @@
           <a:p>
             <a:fld id="{38FD5F5A-ADC8-40D1-8D83-4002D44F1092}" type="datetimeFigureOut">
               <a:rPr lang="en-US" smtClean="0"/>
-              <a:t>22-May-23</a:t>
+              <a:t>25-May-23</a:t>
             </a:fld>
             <a:endParaRPr lang="en-US" dirty="0"/>
           </a:p>
@@ -2507,7 +2508,7 @@
           <a:p>
             <a:fld id="{38FD5F5A-ADC8-40D1-8D83-4002D44F1092}" type="datetimeFigureOut">
               <a:rPr lang="en-US" smtClean="0"/>
-              <a:t>22-May-23</a:t>
+              <a:t>25-May-23</a:t>
             </a:fld>
             <a:endParaRPr lang="en-US" dirty="0"/>
           </a:p>
@@ -2818,7 +2819,7 @@
           <a:p>
             <a:fld id="{38FD5F5A-ADC8-40D1-8D83-4002D44F1092}" type="datetimeFigureOut">
               <a:rPr lang="en-US" smtClean="0"/>
-              <a:t>22-May-23</a:t>
+              <a:t>25-May-23</a:t>
             </a:fld>
             <a:endParaRPr lang="en-US" dirty="0"/>
           </a:p>
@@ -3106,7 +3107,7 @@
           <a:p>
             <a:fld id="{38FD5F5A-ADC8-40D1-8D83-4002D44F1092}" type="datetimeFigureOut">
               <a:rPr lang="en-US" smtClean="0"/>
-              <a:t>22-May-23</a:t>
+              <a:t>25-May-23</a:t>
             </a:fld>
             <a:endParaRPr lang="en-US" dirty="0"/>
           </a:p>
@@ -3347,7 +3348,7 @@
           <a:p>
             <a:fld id="{38FD5F5A-ADC8-40D1-8D83-4002D44F1092}" type="datetimeFigureOut">
               <a:rPr lang="en-US" smtClean="0"/>
-              <a:t>22-May-23</a:t>
+              <a:t>25-May-23</a:t>
             </a:fld>
             <a:endParaRPr lang="en-US" dirty="0"/>
           </a:p>
@@ -19261,8 +19262,8 @@
           </a:fontRef>
         </p:style>
       </p:cxnSp>
-      <mc:AlternateContent xmlns:mc="http://schemas.openxmlformats.org/markup-compatibility/2006">
-        <mc:Choice xmlns:a14="http://schemas.microsoft.com/office/drawing/2010/main" Requires="a14">
+      <mc:AlternateContent xmlns:mc="http://schemas.openxmlformats.org/markup-compatibility/2006" xmlns:a14="http://schemas.microsoft.com/office/drawing/2010/main">
+        <mc:Choice Requires="a14">
           <p:sp>
             <p:nvSpPr>
               <p:cNvPr id="311" name="TextBox 310">
@@ -19319,7 +19320,7 @@
             </p:txBody>
           </p:sp>
         </mc:Choice>
-        <mc:Fallback>
+        <mc:Fallback xmlns="">
           <p:sp>
             <p:nvSpPr>
               <p:cNvPr id="311" name="TextBox 310">
@@ -23307,6 +23308,252 @@
 </p:sld>
 </file>
 
+<file path=ppt/slides/slide4.xml><?xml version="1.0" encoding="utf-8"?>
+<p:sld xmlns:a="http://schemas.openxmlformats.org/drawingml/2006/main" xmlns:r="http://schemas.openxmlformats.org/officeDocument/2006/relationships" xmlns:p="http://schemas.openxmlformats.org/presentationml/2006/main">
+  <p:cSld>
+    <p:spTree>
+      <p:nvGrpSpPr>
+        <p:cNvPr id="1" name=""/>
+        <p:cNvGrpSpPr/>
+        <p:nvPr/>
+      </p:nvGrpSpPr>
+      <p:grpSpPr>
+        <a:xfrm>
+          <a:off x="0" y="0"/>
+          <a:ext cx="0" cy="0"/>
+          <a:chOff x="0" y="0"/>
+          <a:chExt cx="0" cy="0"/>
+        </a:xfrm>
+      </p:grpSpPr>
+      <p:pic>
+        <p:nvPicPr>
+          <p:cNvPr id="10" name="Picture 9">
+            <a:extLst>
+              <a:ext uri="{FF2B5EF4-FFF2-40B4-BE49-F238E27FC236}">
+                <a16:creationId xmlns:a16="http://schemas.microsoft.com/office/drawing/2014/main" id="{AEB4AE3C-F505-4F79-B494-634292BF3399}"/>
+              </a:ext>
+            </a:extLst>
+          </p:cNvPr>
+          <p:cNvPicPr>
+            <a:picLocks noChangeAspect="1"/>
+          </p:cNvPicPr>
+          <p:nvPr/>
+        </p:nvPicPr>
+        <p:blipFill>
+          <a:blip r:embed="rId2"/>
+          <a:stretch>
+            <a:fillRect/>
+          </a:stretch>
+        </p:blipFill>
+        <p:spPr>
+          <a:xfrm>
+            <a:off x="-1751" y="1836297"/>
+            <a:ext cx="5332808" cy="1266910"/>
+          </a:xfrm>
+          <a:prstGeom prst="rect">
+            <a:avLst/>
+          </a:prstGeom>
+        </p:spPr>
+      </p:pic>
+      <p:pic>
+        <p:nvPicPr>
+          <p:cNvPr id="11" name="Picture 10">
+            <a:extLst>
+              <a:ext uri="{FF2B5EF4-FFF2-40B4-BE49-F238E27FC236}">
+                <a16:creationId xmlns:a16="http://schemas.microsoft.com/office/drawing/2014/main" id="{01527BA0-F2EC-4401-81E3-CFA7DBD326AC}"/>
+              </a:ext>
+            </a:extLst>
+          </p:cNvPr>
+          <p:cNvPicPr>
+            <a:picLocks noChangeAspect="1"/>
+          </p:cNvPicPr>
+          <p:nvPr/>
+        </p:nvPicPr>
+        <p:blipFill>
+          <a:blip r:embed="rId3"/>
+          <a:stretch>
+            <a:fillRect/>
+          </a:stretch>
+        </p:blipFill>
+        <p:spPr>
+          <a:xfrm>
+            <a:off x="0" y="254285"/>
+            <a:ext cx="5331058" cy="1267092"/>
+          </a:xfrm>
+          <a:prstGeom prst="rect">
+            <a:avLst/>
+          </a:prstGeom>
+        </p:spPr>
+      </p:pic>
+      <p:sp>
+        <p:nvSpPr>
+          <p:cNvPr id="12" name="TextBox 11">
+            <a:extLst>
+              <a:ext uri="{FF2B5EF4-FFF2-40B4-BE49-F238E27FC236}">
+                <a16:creationId xmlns:a16="http://schemas.microsoft.com/office/drawing/2014/main" id="{A27E5DC3-E567-4123-9B43-E0B63F8931C3}"/>
+              </a:ext>
+            </a:extLst>
+          </p:cNvPr>
+          <p:cNvSpPr txBox="1"/>
+          <p:nvPr/>
+        </p:nvSpPr>
+        <p:spPr>
+          <a:xfrm>
+            <a:off x="-1751" y="0"/>
+            <a:ext cx="4555734" cy="261610"/>
+          </a:xfrm>
+          <a:prstGeom prst="rect">
+            <a:avLst/>
+          </a:prstGeom>
+          <a:noFill/>
+        </p:spPr>
+        <p:txBody>
+          <a:bodyPr wrap="none" lIns="0" tIns="0" rIns="0" rtlCol="0">
+            <a:spAutoFit/>
+          </a:bodyPr>
+          <a:lstStyle/>
+          <a:p>
+            <a:pPr marL="0" algn="l" rtl="0" eaLnBrk="1" latinLnBrk="0" hangingPunct="1">
+              <a:spcBef>
+                <a:spcPts val="0"/>
+              </a:spcBef>
+              <a:spcAft>
+                <a:spcPts val="0"/>
+              </a:spcAft>
+            </a:pPr>
+            <a:r>
+              <a:rPr lang="en-US" sz="1400" kern="1200" dirty="0">
+                <a:solidFill>
+                  <a:srgbClr val="000000"/>
+                </a:solidFill>
+                <a:effectLst/>
+                <a:latin typeface="Times New Roman" panose="02020603050405020304" pitchFamily="18" charset="0"/>
+                <a:ea typeface="+mn-ea"/>
+                <a:cs typeface="Times New Roman" panose="02020603050405020304" pitchFamily="18" charset="0"/>
+              </a:rPr>
+              <a:t>Regular CIBHash (independent bits – O(</a:t>
+            </a:r>
+            <a:r>
+              <a:rPr lang="en-US" sz="1400" i="1" kern="1200" dirty="0">
+                <a:solidFill>
+                  <a:srgbClr val="000000"/>
+                </a:solidFill>
+                <a:effectLst/>
+                <a:latin typeface="Times New Roman" panose="02020603050405020304" pitchFamily="18" charset="0"/>
+                <a:ea typeface="+mn-ea"/>
+                <a:cs typeface="Times New Roman" panose="02020603050405020304" pitchFamily="18" charset="0"/>
+              </a:rPr>
+              <a:t>n</a:t>
+            </a:r>
+            <a:r>
+              <a:rPr lang="en-US" sz="1400" kern="1200" dirty="0">
+                <a:solidFill>
+                  <a:srgbClr val="000000"/>
+                </a:solidFill>
+                <a:effectLst/>
+                <a:latin typeface="Times New Roman" panose="02020603050405020304" pitchFamily="18" charset="0"/>
+                <a:ea typeface="+mn-ea"/>
+                <a:cs typeface="Times New Roman" panose="02020603050405020304" pitchFamily="18" charset="0"/>
+              </a:rPr>
+              <a:t>) search complexity):</a:t>
+            </a:r>
+            <a:endParaRPr lang="en-US" sz="1100" dirty="0">
+              <a:effectLst/>
+            </a:endParaRPr>
+          </a:p>
+        </p:txBody>
+      </p:sp>
+      <p:sp>
+        <p:nvSpPr>
+          <p:cNvPr id="13" name="TextBox 12">
+            <a:extLst>
+              <a:ext uri="{FF2B5EF4-FFF2-40B4-BE49-F238E27FC236}">
+                <a16:creationId xmlns:a16="http://schemas.microsoft.com/office/drawing/2014/main" id="{B0A48959-2F44-4762-BF5B-3816CDFA40AB}"/>
+              </a:ext>
+            </a:extLst>
+          </p:cNvPr>
+          <p:cNvSpPr txBox="1"/>
+          <p:nvPr/>
+        </p:nvSpPr>
+        <p:spPr>
+          <a:xfrm>
+            <a:off x="-1751" y="1528520"/>
+            <a:ext cx="4683975" cy="307777"/>
+          </a:xfrm>
+          <a:prstGeom prst="rect">
+            <a:avLst/>
+          </a:prstGeom>
+          <a:noFill/>
+        </p:spPr>
+        <p:txBody>
+          <a:bodyPr wrap="none" lIns="0" rIns="0" rtlCol="0">
+            <a:spAutoFit/>
+          </a:bodyPr>
+          <a:lstStyle/>
+          <a:p>
+            <a:pPr marL="0" algn="l" rtl="0" eaLnBrk="1" latinLnBrk="0" hangingPunct="1">
+              <a:spcBef>
+                <a:spcPts val="0"/>
+              </a:spcBef>
+              <a:spcAft>
+                <a:spcPts val="0"/>
+              </a:spcAft>
+            </a:pPr>
+            <a:r>
+              <a:rPr lang="en-US" sz="1400" kern="1200" dirty="0">
+                <a:solidFill>
+                  <a:srgbClr val="000000"/>
+                </a:solidFill>
+                <a:effectLst/>
+                <a:latin typeface="Times New Roman" panose="02020603050405020304" pitchFamily="18" charset="0"/>
+                <a:ea typeface="+mn-ea"/>
+                <a:cs typeface="Times New Roman" panose="02020603050405020304" pitchFamily="18" charset="0"/>
+              </a:rPr>
+              <a:t>Proposed approach (decimal numbers – O(</a:t>
+            </a:r>
+            <a:r>
+              <a:rPr lang="en-US" sz="1400" i="1" kern="1200" dirty="0">
+                <a:solidFill>
+                  <a:srgbClr val="000000"/>
+                </a:solidFill>
+                <a:effectLst/>
+                <a:latin typeface="Times New Roman" panose="02020603050405020304" pitchFamily="18" charset="0"/>
+                <a:ea typeface="+mn-ea"/>
+                <a:cs typeface="Times New Roman" panose="02020603050405020304" pitchFamily="18" charset="0"/>
+              </a:rPr>
+              <a:t>k</a:t>
+            </a:r>
+            <a:r>
+              <a:rPr lang="en-US" sz="1400" kern="1200" dirty="0">
+                <a:solidFill>
+                  <a:srgbClr val="000000"/>
+                </a:solidFill>
+                <a:effectLst/>
+                <a:latin typeface="Times New Roman" panose="02020603050405020304" pitchFamily="18" charset="0"/>
+                <a:ea typeface="+mn-ea"/>
+                <a:cs typeface="Times New Roman" panose="02020603050405020304" pitchFamily="18" charset="0"/>
+              </a:rPr>
+              <a:t>) search complexity):</a:t>
+            </a:r>
+            <a:endParaRPr lang="en-US" sz="1100" dirty="0">
+              <a:effectLst/>
+            </a:endParaRPr>
+          </a:p>
+        </p:txBody>
+      </p:sp>
+    </p:spTree>
+    <p:extLst>
+      <p:ext uri="{BB962C8B-B14F-4D97-AF65-F5344CB8AC3E}">
+        <p14:creationId xmlns:p14="http://schemas.microsoft.com/office/powerpoint/2010/main" val="3569604638"/>
+      </p:ext>
+    </p:extLst>
+  </p:cSld>
+  <p:clrMapOvr>
+    <a:masterClrMapping/>
+  </p:clrMapOvr>
+</p:sld>
+</file>
+
 <file path=ppt/theme/theme1.xml><?xml version="1.0" encoding="utf-8"?>
 <a:theme xmlns:a="http://schemas.openxmlformats.org/drawingml/2006/main" name="Office Theme">
   <a:themeElements>

</xml_diff>